<commit_message>
worked on deepSDF autoencoder
</commit_message>
<xml_diff>
--- a/Week 10 March 3rd - March 9th/MY RESEARCH PRESENTATION.pptx
+++ b/Week 10 March 3rd - March 9th/MY RESEARCH PRESENTATION.pptx
@@ -117,6 +117,11 @@
       </a:defRPr>
     </a:lvl9pPr>
   </p:defaultTextStyle>
+  <p:extLst>
+    <p:ext uri="{EFAFB233-063F-42B5-8137-9DF3F51BA10A}">
+      <p15:sldGuideLst xmlns:p15="http://schemas.microsoft.com/office/powerpoint/2012/main"/>
+    </p:ext>
+  </p:extLst>
 </p:presentation>
 </file>
 
@@ -3714,8 +3719,8 @@
             </a:lnSpc>
           </a:pPr>
           <a:r>
-            <a:rPr lang="en-US"/>
-            <a:t>Why we care: each plant point cloud has about 30,000 points. We want to bring this down to a vector or scalar. And have this vector applied to other fields/research topics like GWAS</a:t>
+            <a:rPr lang="en-US" dirty="0"/>
+            <a:t>Why we care: each plant point cloud has about 30,000 points. We want to bring this down to a vector or scalar. And have this applied to other fields/research topics like GWAS</a:t>
           </a:r>
         </a:p>
       </dgm:t>
@@ -3755,7 +3760,7 @@
             </a:lnSpc>
           </a:pPr>
           <a:r>
-            <a:rPr lang="en-US"/>
+            <a:rPr lang="en-US" dirty="0"/>
             <a:t>Research question: can we train a model to learn an accurate latent representation of 1,400 point clouds, use Lipschitz regularization to smoothen our results, and have the returned vector as a function that’s plottable and useful for GWAS</a:t>
           </a:r>
         </a:p>
@@ -5874,8 +5879,8 @@
             <a:buNone/>
           </a:pPr>
           <a:r>
-            <a:rPr lang="en-US" sz="1900" kern="1200"/>
-            <a:t>Why we care: each plant point cloud has about 30,000 points. We want to bring this down to a vector or scalar. And have this vector applied to other fields/research topics like GWAS</a:t>
+            <a:rPr lang="en-US" sz="1900" kern="1200" dirty="0"/>
+            <a:t>Why we care: each plant point cloud has about 30,000 points. We want to bring this down to a vector or scalar. And have this applied to other fields/research topics like GWAS</a:t>
           </a:r>
         </a:p>
       </dsp:txBody>
@@ -6026,7 +6031,7 @@
             <a:buNone/>
           </a:pPr>
           <a:r>
-            <a:rPr lang="en-US" sz="1900" kern="1200"/>
+            <a:rPr lang="en-US" sz="1900" kern="1200" dirty="0"/>
             <a:t>Research question: can we train a model to learn an accurate latent representation of 1,400 point clouds, use Lipschitz regularization to smoothen our results, and have the returned vector as a function that’s plottable and useful for GWAS</a:t>
           </a:r>
         </a:p>
@@ -13062,7 +13067,7 @@
           <a:p>
             <a:fld id="{2D001350-3391-BD4B-9054-0A833CECD306}" type="datetimeFigureOut">
               <a:rPr lang="en-US" smtClean="0"/>
-              <a:t>3/5/24</a:t>
+              <a:t>3/11/24</a:t>
             </a:fld>
             <a:endParaRPr lang="en-US"/>
           </a:p>
@@ -13260,7 +13265,7 @@
           <a:p>
             <a:fld id="{2D001350-3391-BD4B-9054-0A833CECD306}" type="datetimeFigureOut">
               <a:rPr lang="en-US" smtClean="0"/>
-              <a:t>3/5/24</a:t>
+              <a:t>3/11/24</a:t>
             </a:fld>
             <a:endParaRPr lang="en-US"/>
           </a:p>
@@ -13468,7 +13473,7 @@
           <a:p>
             <a:fld id="{2D001350-3391-BD4B-9054-0A833CECD306}" type="datetimeFigureOut">
               <a:rPr lang="en-US" smtClean="0"/>
-              <a:t>3/5/24</a:t>
+              <a:t>3/11/24</a:t>
             </a:fld>
             <a:endParaRPr lang="en-US"/>
           </a:p>
@@ -13666,7 +13671,7 @@
           <a:p>
             <a:fld id="{2D001350-3391-BD4B-9054-0A833CECD306}" type="datetimeFigureOut">
               <a:rPr lang="en-US" smtClean="0"/>
-              <a:t>3/5/24</a:t>
+              <a:t>3/11/24</a:t>
             </a:fld>
             <a:endParaRPr lang="en-US"/>
           </a:p>
@@ -13941,7 +13946,7 @@
           <a:p>
             <a:fld id="{2D001350-3391-BD4B-9054-0A833CECD306}" type="datetimeFigureOut">
               <a:rPr lang="en-US" smtClean="0"/>
-              <a:t>3/5/24</a:t>
+              <a:t>3/11/24</a:t>
             </a:fld>
             <a:endParaRPr lang="en-US"/>
           </a:p>
@@ -14206,7 +14211,7 @@
           <a:p>
             <a:fld id="{2D001350-3391-BD4B-9054-0A833CECD306}" type="datetimeFigureOut">
               <a:rPr lang="en-US" smtClean="0"/>
-              <a:t>3/5/24</a:t>
+              <a:t>3/11/24</a:t>
             </a:fld>
             <a:endParaRPr lang="en-US"/>
           </a:p>
@@ -14618,7 +14623,7 @@
           <a:p>
             <a:fld id="{2D001350-3391-BD4B-9054-0A833CECD306}" type="datetimeFigureOut">
               <a:rPr lang="en-US" smtClean="0"/>
-              <a:t>3/5/24</a:t>
+              <a:t>3/11/24</a:t>
             </a:fld>
             <a:endParaRPr lang="en-US"/>
           </a:p>
@@ -14759,7 +14764,7 @@
           <a:p>
             <a:fld id="{2D001350-3391-BD4B-9054-0A833CECD306}" type="datetimeFigureOut">
               <a:rPr lang="en-US" smtClean="0"/>
-              <a:t>3/5/24</a:t>
+              <a:t>3/11/24</a:t>
             </a:fld>
             <a:endParaRPr lang="en-US"/>
           </a:p>
@@ -14872,7 +14877,7 @@
           <a:p>
             <a:fld id="{2D001350-3391-BD4B-9054-0A833CECD306}" type="datetimeFigureOut">
               <a:rPr lang="en-US" smtClean="0"/>
-              <a:t>3/5/24</a:t>
+              <a:t>3/11/24</a:t>
             </a:fld>
             <a:endParaRPr lang="en-US"/>
           </a:p>
@@ -15183,7 +15188,7 @@
           <a:p>
             <a:fld id="{2D001350-3391-BD4B-9054-0A833CECD306}" type="datetimeFigureOut">
               <a:rPr lang="en-US" smtClean="0"/>
-              <a:t>3/5/24</a:t>
+              <a:t>3/11/24</a:t>
             </a:fld>
             <a:endParaRPr lang="en-US"/>
           </a:p>
@@ -15471,7 +15476,7 @@
           <a:p>
             <a:fld id="{2D001350-3391-BD4B-9054-0A833CECD306}" type="datetimeFigureOut">
               <a:rPr lang="en-US" smtClean="0"/>
-              <a:t>3/5/24</a:t>
+              <a:t>3/11/24</a:t>
             </a:fld>
             <a:endParaRPr lang="en-US"/>
           </a:p>
@@ -15712,7 +15717,7 @@
           <a:p>
             <a:fld id="{2D001350-3391-BD4B-9054-0A833CECD306}" type="datetimeFigureOut">
               <a:rPr lang="en-US" smtClean="0"/>
-              <a:t>3/5/24</a:t>
+              <a:t>3/11/24</a:t>
             </a:fld>
             <a:endParaRPr lang="en-US"/>
           </a:p>
@@ -26908,7 +26913,7 @@
             <p:ph idx="1"/>
             <p:extLst>
               <p:ext uri="{D42A27DB-BD31-4B8C-83A1-F6EECF244321}">
-                <p14:modId xmlns:p14="http://schemas.microsoft.com/office/powerpoint/2010/main" val="3012480000"/>
+                <p14:modId xmlns:p14="http://schemas.microsoft.com/office/powerpoint/2010/main" val="1838463347"/>
               </p:ext>
             </p:extLst>
           </p:nvPr>
@@ -29442,14 +29447,14 @@
               <a:buAutoNum type="arabicPeriod"/>
             </a:pPr>
             <a:r>
-              <a:rPr lang="en-US" sz="1500" b="1" i="0">
+              <a:rPr lang="en-US" sz="1500" b="1" i="0" dirty="0">
                 <a:effectLst/>
                 <a:latin typeface="Söhne"/>
               </a:rPr>
-              <a:t>Learning Latent Representations</a:t>
+              <a:t>Learning Latent Representations with MLP</a:t>
             </a:r>
             <a:r>
-              <a:rPr lang="en-US" sz="1500" b="0" i="0">
+              <a:rPr lang="en-US" sz="1500" b="0" i="0" dirty="0">
                 <a:effectLst/>
                 <a:latin typeface="Söhne"/>
               </a:rPr>
@@ -29462,42 +29467,42 @@
               <a:buAutoNum type="arabicPeriod"/>
             </a:pPr>
             <a:r>
-              <a:rPr lang="en-US" sz="1500" b="1" i="0">
+              <a:rPr lang="en-US" sz="1500" b="1" i="0" dirty="0">
                 <a:effectLst/>
                 <a:latin typeface="Söhne"/>
               </a:rPr>
               <a:t>Use of SDF and </a:t>
             </a:r>
             <a:r>
-              <a:rPr lang="en-US" sz="1500" b="1" i="0" err="1">
+              <a:rPr lang="en-US" sz="1500" b="1" i="0" dirty="0" err="1">
                 <a:effectLst/>
                 <a:latin typeface="Söhne"/>
               </a:rPr>
               <a:t>Eikonal</a:t>
             </a:r>
             <a:r>
-              <a:rPr lang="en-US" sz="1500" b="1" i="0">
+              <a:rPr lang="en-US" sz="1500" b="1" i="0" dirty="0">
                 <a:effectLst/>
                 <a:latin typeface="Söhne"/>
               </a:rPr>
               <a:t> Loss</a:t>
             </a:r>
             <a:r>
-              <a:rPr lang="en-US" sz="1500" b="0" i="0">
+              <a:rPr lang="en-US" sz="1500" b="0" i="0" dirty="0">
                 <a:effectLst/>
                 <a:latin typeface="Söhne"/>
               </a:rPr>
               <a:t>: Utilizing Signed Distance Functions (SDF) alongside </a:t>
             </a:r>
             <a:r>
-              <a:rPr lang="en-US" sz="1500" b="0" i="0" err="1">
+              <a:rPr lang="en-US" sz="1500" b="0" i="0" dirty="0" err="1">
                 <a:effectLst/>
                 <a:latin typeface="Söhne"/>
               </a:rPr>
               <a:t>Eikonal</a:t>
             </a:r>
             <a:r>
-              <a:rPr lang="en-US" sz="1500" b="0" i="0">
+              <a:rPr lang="en-US" sz="1500" b="0" i="0" dirty="0">
                 <a:effectLst/>
                 <a:latin typeface="Söhne"/>
               </a:rPr>
@@ -29510,14 +29515,14 @@
               <a:buAutoNum type="arabicPeriod"/>
             </a:pPr>
             <a:r>
-              <a:rPr lang="en-US" sz="1500" b="1" i="0">
+              <a:rPr lang="en-US" sz="1500" b="1" i="0" dirty="0">
                 <a:effectLst/>
                 <a:latin typeface="Söhne"/>
               </a:rPr>
               <a:t>Lipschitz Regularization</a:t>
             </a:r>
             <a:r>
-              <a:rPr lang="en-US" sz="1500" b="0" i="0">
+              <a:rPr lang="en-US" sz="1500" b="0" i="0" dirty="0">
                 <a:effectLst/>
                 <a:latin typeface="Söhne"/>
               </a:rPr>
@@ -29530,14 +29535,14 @@
               <a:buAutoNum type="arabicPeriod"/>
             </a:pPr>
             <a:r>
-              <a:rPr lang="en-US" sz="1500" b="1" i="0">
+              <a:rPr lang="en-US" sz="1500" b="1" i="0" dirty="0">
                 <a:effectLst/>
                 <a:latin typeface="Söhne"/>
               </a:rPr>
               <a:t>Smoothness and Robustness</a:t>
             </a:r>
             <a:r>
-              <a:rPr lang="en-US" sz="1500" b="0" i="0">
+              <a:rPr lang="en-US" sz="1500" b="0" i="0" dirty="0">
                 <a:effectLst/>
                 <a:latin typeface="Söhne"/>
               </a:rPr>
@@ -29550,14 +29555,14 @@
               <a:buAutoNum type="arabicPeriod"/>
             </a:pPr>
             <a:r>
-              <a:rPr lang="en-US" sz="1500" b="1" i="0">
+              <a:rPr lang="en-US" sz="1500" b="1" i="0" dirty="0">
                 <a:effectLst/>
                 <a:latin typeface="Söhne"/>
               </a:rPr>
               <a:t>Experimentation with Latent Vector Sizes</a:t>
             </a:r>
             <a:r>
-              <a:rPr lang="en-US" sz="1500" b="0" i="0">
+              <a:rPr lang="en-US" sz="1500" b="0" i="0" dirty="0">
                 <a:effectLst/>
                 <a:latin typeface="Söhne"/>
               </a:rPr>
@@ -29570,14 +29575,14 @@
               <a:buAutoNum type="arabicPeriod"/>
             </a:pPr>
             <a:r>
-              <a:rPr lang="en-US" sz="1500" b="1" i="0">
+              <a:rPr lang="en-US" sz="1500" b="1" i="0" dirty="0">
                 <a:effectLst/>
                 <a:latin typeface="Söhne"/>
               </a:rPr>
               <a:t>Vector Functionality</a:t>
             </a:r>
             <a:r>
-              <a:rPr lang="en-US" sz="1500" b="0" i="0">
+              <a:rPr lang="en-US" sz="1500" b="0" i="0" dirty="0">
                 <a:effectLst/>
                 <a:latin typeface="Söhne"/>
               </a:rPr>
@@ -29585,7 +29590,7 @@
             </a:r>
           </a:p>
           <a:p>
-            <a:endParaRPr lang="en-US" sz="1500"/>
+            <a:endParaRPr lang="en-US" sz="1500" dirty="0"/>
           </a:p>
         </p:txBody>
       </p:sp>
@@ -29815,28 +29820,28 @@
               <a:buAutoNum type="arabicPeriod"/>
             </a:pPr>
             <a:r>
-              <a:rPr lang="en-US" sz="1500" b="1" i="0">
+              <a:rPr lang="en-US" sz="1500" b="1" i="0" dirty="0">
                 <a:effectLst/>
                 <a:latin typeface="Söhne"/>
               </a:rPr>
               <a:t>Complexity of Training</a:t>
             </a:r>
             <a:r>
-              <a:rPr lang="en-US" sz="1500" b="0" i="0">
+              <a:rPr lang="en-US" sz="1500" b="0" i="0" dirty="0">
                 <a:effectLst/>
                 <a:latin typeface="Söhne"/>
               </a:rPr>
               <a:t>: Training MLPs, especially with complex loss functions like SDF and </a:t>
             </a:r>
             <a:r>
-              <a:rPr lang="en-US" sz="1500" b="0" i="0" err="1">
+              <a:rPr lang="en-US" sz="1500" b="0" i="0" dirty="0" err="1">
                 <a:effectLst/>
                 <a:latin typeface="Söhne"/>
               </a:rPr>
               <a:t>Eikonal</a:t>
             </a:r>
             <a:r>
-              <a:rPr lang="en-US" sz="1500" b="0" i="0">
+              <a:rPr lang="en-US" sz="1500" b="0" i="0" dirty="0">
                 <a:effectLst/>
                 <a:latin typeface="Söhne"/>
               </a:rPr>
@@ -29849,14 +29854,14 @@
               <a:buAutoNum type="arabicPeriod"/>
             </a:pPr>
             <a:r>
-              <a:rPr lang="en-US" sz="1500" b="1" i="0">
+              <a:rPr lang="en-US" sz="1500" b="1" i="0" dirty="0">
                 <a:effectLst/>
                 <a:latin typeface="Söhne"/>
               </a:rPr>
               <a:t>Overfitting Risk</a:t>
             </a:r>
             <a:r>
-              <a:rPr lang="en-US" sz="1500" b="0" i="0">
+              <a:rPr lang="en-US" sz="1500" b="0" i="0" dirty="0">
                 <a:effectLst/>
                 <a:latin typeface="Söhne"/>
               </a:rPr>
@@ -29869,14 +29874,14 @@
               <a:buAutoNum type="arabicPeriod"/>
             </a:pPr>
             <a:r>
-              <a:rPr lang="en-US" sz="1500" b="1" i="0">
+              <a:rPr lang="en-US" sz="1500" b="1" i="0" dirty="0">
                 <a:effectLst/>
                 <a:latin typeface="Söhne"/>
               </a:rPr>
               <a:t>Generalization Issues</a:t>
             </a:r>
             <a:r>
-              <a:rPr lang="en-US" sz="1500" b="0" i="0">
+              <a:rPr lang="en-US" sz="1500" b="0" i="0" dirty="0">
                 <a:effectLst/>
                 <a:latin typeface="Söhne"/>
               </a:rPr>
@@ -29889,14 +29894,14 @@
               <a:buAutoNum type="arabicPeriod"/>
             </a:pPr>
             <a:r>
-              <a:rPr lang="en-US" sz="1500" b="1" i="0">
+              <a:rPr lang="en-US" sz="1500" b="1" i="0" dirty="0">
                 <a:effectLst/>
                 <a:latin typeface="Söhne"/>
               </a:rPr>
               <a:t>Dependency on Data Quality</a:t>
             </a:r>
             <a:r>
-              <a:rPr lang="en-US" sz="1500" b="0" i="0">
+              <a:rPr lang="en-US" sz="1500" b="0" i="0" dirty="0">
                 <a:effectLst/>
                 <a:latin typeface="Söhne"/>
               </a:rPr>
@@ -29909,14 +29914,14 @@
               <a:buAutoNum type="arabicPeriod"/>
             </a:pPr>
             <a:r>
-              <a:rPr lang="en-US" sz="1500" b="1" i="0">
+              <a:rPr lang="en-US" sz="1500" b="1" i="0" dirty="0">
                 <a:effectLst/>
                 <a:latin typeface="Söhne"/>
               </a:rPr>
               <a:t>Interpretability Challenges</a:t>
             </a:r>
             <a:r>
-              <a:rPr lang="en-US" sz="1500" b="0" i="0">
+              <a:rPr lang="en-US" sz="1500" b="0" i="0" dirty="0">
                 <a:effectLst/>
                 <a:latin typeface="Söhne"/>
               </a:rPr>
@@ -29929,28 +29934,28 @@
               <a:buAutoNum type="arabicPeriod"/>
             </a:pPr>
             <a:r>
-              <a:rPr lang="en-US" sz="1500" b="1" i="0">
+              <a:rPr lang="en-US" sz="1500" b="1" i="0" dirty="0">
                 <a:effectLst/>
                 <a:latin typeface="Söhne"/>
               </a:rPr>
               <a:t>Optimization Difficulty</a:t>
             </a:r>
             <a:r>
-              <a:rPr lang="en-US" sz="1500" b="0" i="0">
+              <a:rPr lang="en-US" sz="1500" b="0" i="0" dirty="0">
                 <a:effectLst/>
                 <a:latin typeface="Söhne"/>
               </a:rPr>
               <a:t>: Balancing the SDF, </a:t>
             </a:r>
             <a:r>
-              <a:rPr lang="en-US" sz="1500" b="0" i="0" err="1">
+              <a:rPr lang="en-US" sz="1500" b="0" i="0" dirty="0" err="1">
                 <a:effectLst/>
                 <a:latin typeface="Söhne"/>
               </a:rPr>
               <a:t>Eikonal</a:t>
             </a:r>
             <a:r>
-              <a:rPr lang="en-US" sz="1500" b="0" i="0">
+              <a:rPr lang="en-US" sz="1500" b="0" i="0" dirty="0">
                 <a:effectLst/>
                 <a:latin typeface="Söhne"/>
               </a:rPr>

</xml_diff>